<commit_message>
Make changes on presentation
</commit_message>
<xml_diff>
--- a/Documents/Presentation.pptx
+++ b/Documents/Presentation.pptx
@@ -14,13 +14,16 @@
     <p:sldId id="262" r:id="rId12"/>
     <p:sldId id="263" r:id="rId13"/>
     <p:sldId id="264" r:id="rId14"/>
+    <p:sldId id="265" r:id="rId15"/>
+    <p:sldId id="266" r:id="rId16"/>
+    <p:sldId id="267" r:id="rId17"/>
   </p:sldIdLst>
   <p:sldSz cx="18288000" cy="10287000"/>
   <p:notesSz cx="6858000" cy="9144000"/>
   <p:embeddedFontLst>
     <p:embeddedFont>
       <p:font typeface="Agrandir" charset="1" panose="00000500000000000000"/>
-      <p:regular r:id="rId15"/>
+      <p:regular r:id="rId18"/>
     </p:embeddedFont>
   </p:embeddedFontLst>
   <p:defaultTextStyle>
@@ -3215,6 +3218,489 @@
 </p:sld>
 </file>
 
+<file path=ppt/slides/slide10.xml><?xml version="1.0" encoding="utf-8"?>
+<p:sld xmlns:p="http://schemas.openxmlformats.org/presentationml/2006/main" xmlns:a="http://schemas.openxmlformats.org/drawingml/2006/main" xmlns:r="http://schemas.openxmlformats.org/officeDocument/2006/relationships">
+  <p:cSld>
+    <p:bg>
+      <p:bgPr>
+        <a:solidFill>
+          <a:srgbClr val="F6E4E3"/>
+        </a:solidFill>
+      </p:bgPr>
+    </p:bg>
+    <p:spTree>
+      <p:nvGrpSpPr>
+        <p:cNvPr id="1" name=""/>
+        <p:cNvGrpSpPr/>
+        <p:nvPr/>
+      </p:nvGrpSpPr>
+      <p:grpSpPr>
+        <a:xfrm>
+          <a:off x="0" y="0"/>
+          <a:ext cx="0" cy="0"/>
+          <a:chOff x="0" y="0"/>
+          <a:chExt cx="0" cy="0"/>
+        </a:xfrm>
+      </p:grpSpPr>
+      <p:sp>
+        <p:nvSpPr>
+          <p:cNvPr name="Freeform 2" id="2"/>
+          <p:cNvSpPr/>
+          <p:nvPr/>
+        </p:nvSpPr>
+        <p:spPr>
+          <a:xfrm flipH="false" flipV="false" rot="0">
+            <a:off x="807263" y="2382702"/>
+            <a:ext cx="8336737" cy="5845422"/>
+          </a:xfrm>
+          <a:custGeom>
+            <a:avLst/>
+            <a:gdLst/>
+            <a:ahLst/>
+            <a:cxnLst/>
+            <a:rect r="r" b="b" t="t" l="l"/>
+            <a:pathLst>
+              <a:path h="5845422" w="8336737">
+                <a:moveTo>
+                  <a:pt x="0" y="0"/>
+                </a:moveTo>
+                <a:lnTo>
+                  <a:pt x="8336737" y="0"/>
+                </a:lnTo>
+                <a:lnTo>
+                  <a:pt x="8336737" y="5845422"/>
+                </a:lnTo>
+                <a:lnTo>
+                  <a:pt x="0" y="5845422"/>
+                </a:lnTo>
+                <a:lnTo>
+                  <a:pt x="0" y="0"/>
+                </a:lnTo>
+                <a:close/>
+              </a:path>
+            </a:pathLst>
+          </a:custGeom>
+          <a:blipFill>
+            <a:blip r:embed="rId2"/>
+            <a:stretch>
+              <a:fillRect l="0" t="0" r="0" b="0"/>
+            </a:stretch>
+          </a:blipFill>
+        </p:spPr>
+      </p:sp>
+      <p:sp>
+        <p:nvSpPr>
+          <p:cNvPr name="Freeform 3" id="3"/>
+          <p:cNvSpPr/>
+          <p:nvPr/>
+        </p:nvSpPr>
+        <p:spPr>
+          <a:xfrm flipH="false" flipV="false" rot="0">
+            <a:off x="9472870" y="2382702"/>
+            <a:ext cx="8265445" cy="5856474"/>
+          </a:xfrm>
+          <a:custGeom>
+            <a:avLst/>
+            <a:gdLst/>
+            <a:ahLst/>
+            <a:cxnLst/>
+            <a:rect r="r" b="b" t="t" l="l"/>
+            <a:pathLst>
+              <a:path h="5856474" w="8265445">
+                <a:moveTo>
+                  <a:pt x="0" y="0"/>
+                </a:moveTo>
+                <a:lnTo>
+                  <a:pt x="8265445" y="0"/>
+                </a:lnTo>
+                <a:lnTo>
+                  <a:pt x="8265445" y="5856474"/>
+                </a:lnTo>
+                <a:lnTo>
+                  <a:pt x="0" y="5856474"/>
+                </a:lnTo>
+                <a:lnTo>
+                  <a:pt x="0" y="0"/>
+                </a:lnTo>
+                <a:close/>
+              </a:path>
+            </a:pathLst>
+          </a:custGeom>
+          <a:blipFill>
+            <a:blip r:embed="rId3"/>
+            <a:stretch>
+              <a:fillRect l="0" t="0" r="0" b="0"/>
+            </a:stretch>
+          </a:blipFill>
+        </p:spPr>
+      </p:sp>
+      <p:sp>
+        <p:nvSpPr>
+          <p:cNvPr name="TextBox 4" id="4"/>
+          <p:cNvSpPr txBox="true"/>
+          <p:nvPr/>
+        </p:nvSpPr>
+        <p:spPr>
+          <a:xfrm rot="0">
+            <a:off x="1604389" y="309590"/>
+            <a:ext cx="15433791" cy="1247721"/>
+          </a:xfrm>
+          <a:prstGeom prst="rect">
+            <a:avLst/>
+          </a:prstGeom>
+        </p:spPr>
+        <p:txBody>
+          <a:bodyPr anchor="t" rtlCol="false" tIns="0" lIns="0" bIns="0" rIns="0">
+            <a:spAutoFit/>
+          </a:bodyPr>
+          <a:lstStyle/>
+          <a:p>
+            <a:pPr algn="l" marL="0" indent="0" lvl="0">
+              <a:lnSpc>
+                <a:spcPts val="8399"/>
+              </a:lnSpc>
+              <a:spcBef>
+                <a:spcPct val="0"/>
+              </a:spcBef>
+            </a:pPr>
+            <a:r>
+              <a:rPr lang="en-US" sz="6999">
+                <a:solidFill>
+                  <a:srgbClr val="2B2B2B"/>
+                </a:solidFill>
+                <a:latin typeface="Agrandir"/>
+                <a:ea typeface="Agrandir"/>
+                <a:cs typeface="Agrandir"/>
+                <a:sym typeface="Agrandir"/>
+              </a:rPr>
+              <a:t>Further development / ongoing ideas </a:t>
+            </a:r>
+          </a:p>
+        </p:txBody>
+      </p:sp>
+    </p:spTree>
+  </p:cSld>
+  <p:clrMapOvr>
+    <a:masterClrMapping/>
+  </p:clrMapOvr>
+  <p:transition spd="slow">
+    <p:push dir="l"/>
+  </p:transition>
+</p:sld>
+</file>
+
+<file path=ppt/slides/slide11.xml><?xml version="1.0" encoding="utf-8"?>
+<p:sld xmlns:p="http://schemas.openxmlformats.org/presentationml/2006/main" xmlns:a="http://schemas.openxmlformats.org/drawingml/2006/main" xmlns:r="http://schemas.openxmlformats.org/officeDocument/2006/relationships">
+  <p:cSld>
+    <p:bg>
+      <p:bgPr>
+        <a:solidFill>
+          <a:srgbClr val="F6E4E3"/>
+        </a:solidFill>
+      </p:bgPr>
+    </p:bg>
+    <p:spTree>
+      <p:nvGrpSpPr>
+        <p:cNvPr id="1" name=""/>
+        <p:cNvGrpSpPr/>
+        <p:nvPr/>
+      </p:nvGrpSpPr>
+      <p:grpSpPr>
+        <a:xfrm>
+          <a:off x="0" y="0"/>
+          <a:ext cx="0" cy="0"/>
+          <a:chOff x="0" y="0"/>
+          <a:chExt cx="0" cy="0"/>
+        </a:xfrm>
+      </p:grpSpPr>
+      <p:sp>
+        <p:nvSpPr>
+          <p:cNvPr name="Freeform 2" id="2"/>
+          <p:cNvSpPr/>
+          <p:nvPr/>
+        </p:nvSpPr>
+        <p:spPr>
+          <a:xfrm flipH="false" flipV="false" rot="0">
+            <a:off x="2982402" y="1557310"/>
+            <a:ext cx="11585748" cy="8203149"/>
+          </a:xfrm>
+          <a:custGeom>
+            <a:avLst/>
+            <a:gdLst/>
+            <a:ahLst/>
+            <a:cxnLst/>
+            <a:rect r="r" b="b" t="t" l="l"/>
+            <a:pathLst>
+              <a:path h="8203149" w="11585748">
+                <a:moveTo>
+                  <a:pt x="0" y="0"/>
+                </a:moveTo>
+                <a:lnTo>
+                  <a:pt x="11585748" y="0"/>
+                </a:lnTo>
+                <a:lnTo>
+                  <a:pt x="11585748" y="8203149"/>
+                </a:lnTo>
+                <a:lnTo>
+                  <a:pt x="0" y="8203149"/>
+                </a:lnTo>
+                <a:lnTo>
+                  <a:pt x="0" y="0"/>
+                </a:lnTo>
+                <a:close/>
+              </a:path>
+            </a:pathLst>
+          </a:custGeom>
+          <a:blipFill>
+            <a:blip r:embed="rId2"/>
+            <a:stretch>
+              <a:fillRect l="-283" t="0" r="-504" b="0"/>
+            </a:stretch>
+          </a:blipFill>
+        </p:spPr>
+      </p:sp>
+      <p:sp>
+        <p:nvSpPr>
+          <p:cNvPr name="TextBox 3" id="3"/>
+          <p:cNvSpPr txBox="true"/>
+          <p:nvPr/>
+        </p:nvSpPr>
+        <p:spPr>
+          <a:xfrm rot="0">
+            <a:off x="1604389" y="309590"/>
+            <a:ext cx="15433791" cy="1247721"/>
+          </a:xfrm>
+          <a:prstGeom prst="rect">
+            <a:avLst/>
+          </a:prstGeom>
+        </p:spPr>
+        <p:txBody>
+          <a:bodyPr anchor="t" rtlCol="false" tIns="0" lIns="0" bIns="0" rIns="0">
+            <a:spAutoFit/>
+          </a:bodyPr>
+          <a:lstStyle/>
+          <a:p>
+            <a:pPr algn="l" marL="0" indent="0" lvl="0">
+              <a:lnSpc>
+                <a:spcPts val="8399"/>
+              </a:lnSpc>
+              <a:spcBef>
+                <a:spcPct val="0"/>
+              </a:spcBef>
+            </a:pPr>
+            <a:r>
+              <a:rPr lang="en-US" sz="6999">
+                <a:solidFill>
+                  <a:srgbClr val="2B2B2B"/>
+                </a:solidFill>
+                <a:latin typeface="Agrandir"/>
+                <a:ea typeface="Agrandir"/>
+                <a:cs typeface="Agrandir"/>
+                <a:sym typeface="Agrandir"/>
+              </a:rPr>
+              <a:t>Further development / ongoing ideas </a:t>
+            </a:r>
+          </a:p>
+        </p:txBody>
+      </p:sp>
+    </p:spTree>
+  </p:cSld>
+  <p:clrMapOvr>
+    <a:masterClrMapping/>
+  </p:clrMapOvr>
+  <p:transition spd="slow">
+    <p:push dir="l"/>
+  </p:transition>
+</p:sld>
+</file>
+
+<file path=ppt/slides/slide12.xml><?xml version="1.0" encoding="utf-8"?>
+<p:sld xmlns:p="http://schemas.openxmlformats.org/presentationml/2006/main" xmlns:a="http://schemas.openxmlformats.org/drawingml/2006/main" xmlns:r="http://schemas.openxmlformats.org/officeDocument/2006/relationships">
+  <p:cSld>
+    <p:bg>
+      <p:bgPr>
+        <a:solidFill>
+          <a:srgbClr val="FFFCF7"/>
+        </a:solidFill>
+      </p:bgPr>
+    </p:bg>
+    <p:spTree>
+      <p:nvGrpSpPr>
+        <p:cNvPr id="1" name=""/>
+        <p:cNvGrpSpPr/>
+        <p:nvPr/>
+      </p:nvGrpSpPr>
+      <p:grpSpPr>
+        <a:xfrm>
+          <a:off x="0" y="0"/>
+          <a:ext cx="0" cy="0"/>
+          <a:chOff x="0" y="0"/>
+          <a:chExt cx="0" cy="0"/>
+        </a:xfrm>
+      </p:grpSpPr>
+      <p:pic>
+        <p:nvPicPr>
+          <p:cNvPr name="Picture 2" id="2"/>
+          <p:cNvPicPr>
+            <a:picLocks noChangeAspect="true"/>
+          </p:cNvPicPr>
+          <p:nvPr/>
+        </p:nvPicPr>
+        <p:blipFill>
+          <a:blip r:embed="rId2">
+            <a:alphaModFix amt="25000"/>
+          </a:blip>
+          <a:srcRect l="0" t="0" r="0" b="0"/>
+          <a:stretch>
+            <a:fillRect/>
+          </a:stretch>
+        </p:blipFill>
+        <p:spPr>
+          <a:xfrm flipH="false" flipV="false" rot="0">
+            <a:off x="-1662681" y="-6438340"/>
+            <a:ext cx="13761077" cy="14153590"/>
+          </a:xfrm>
+          <a:prstGeom prst="rect">
+            <a:avLst/>
+          </a:prstGeom>
+        </p:spPr>
+      </p:pic>
+      <p:sp>
+        <p:nvSpPr>
+          <p:cNvPr name="TextBox 3" id="3"/>
+          <p:cNvSpPr txBox="true"/>
+          <p:nvPr/>
+        </p:nvSpPr>
+        <p:spPr>
+          <a:xfrm rot="0">
+            <a:off x="2867561" y="2684205"/>
+            <a:ext cx="12516264" cy="3431177"/>
+          </a:xfrm>
+          <a:prstGeom prst="rect">
+            <a:avLst/>
+          </a:prstGeom>
+        </p:spPr>
+        <p:txBody>
+          <a:bodyPr anchor="t" rtlCol="false" tIns="0" lIns="0" bIns="0" rIns="0">
+            <a:spAutoFit/>
+          </a:bodyPr>
+          <a:lstStyle/>
+          <a:p>
+            <a:pPr algn="ctr" marL="0" indent="0" lvl="0">
+              <a:lnSpc>
+                <a:spcPts val="12419"/>
+              </a:lnSpc>
+              <a:spcBef>
+                <a:spcPct val="0"/>
+              </a:spcBef>
+            </a:pPr>
+            <a:r>
+              <a:rPr lang="en-US" sz="10349">
+                <a:solidFill>
+                  <a:srgbClr val="2B2B2B"/>
+                </a:solidFill>
+                <a:latin typeface="Agrandir"/>
+                <a:ea typeface="Agrandir"/>
+                <a:cs typeface="Agrandir"/>
+                <a:sym typeface="Agrandir"/>
+              </a:rPr>
+              <a:t>Let’s get to the web app!</a:t>
+            </a:r>
+          </a:p>
+        </p:txBody>
+      </p:sp>
+      <p:pic>
+        <p:nvPicPr>
+          <p:cNvPr name="Picture 4" id="4"/>
+          <p:cNvPicPr>
+            <a:picLocks noChangeAspect="true"/>
+          </p:cNvPicPr>
+          <p:nvPr/>
+        </p:nvPicPr>
+        <p:blipFill>
+          <a:blip r:embed="rId3">
+            <a:alphaModFix amt="25000"/>
+          </a:blip>
+          <a:srcRect l="0" t="0" r="0" b="0"/>
+          <a:stretch>
+            <a:fillRect/>
+          </a:stretch>
+        </p:blipFill>
+        <p:spPr>
+          <a:xfrm flipH="false" flipV="false" rot="0">
+            <a:off x="11511932" y="6947324"/>
+            <a:ext cx="8674222" cy="7652259"/>
+          </a:xfrm>
+          <a:prstGeom prst="rect">
+            <a:avLst/>
+          </a:prstGeom>
+        </p:spPr>
+      </p:pic>
+      <p:pic>
+        <p:nvPicPr>
+          <p:cNvPr name="Picture 5" id="5"/>
+          <p:cNvPicPr>
+            <a:picLocks noChangeAspect="true"/>
+          </p:cNvPicPr>
+          <p:nvPr/>
+        </p:nvPicPr>
+        <p:blipFill>
+          <a:blip r:embed="rId4">
+            <a:alphaModFix amt="25000"/>
+          </a:blip>
+          <a:srcRect l="0" t="0" r="0" b="0"/>
+          <a:stretch>
+            <a:fillRect/>
+          </a:stretch>
+        </p:blipFill>
+        <p:spPr>
+          <a:xfrm flipH="false" flipV="false" rot="0">
+            <a:off x="15141061" y="2810706"/>
+            <a:ext cx="6293877" cy="5612932"/>
+          </a:xfrm>
+          <a:prstGeom prst="rect">
+            <a:avLst/>
+          </a:prstGeom>
+        </p:spPr>
+      </p:pic>
+      <p:pic>
+        <p:nvPicPr>
+          <p:cNvPr name="Picture 6" id="6"/>
+          <p:cNvPicPr>
+            <a:picLocks noChangeAspect="true"/>
+          </p:cNvPicPr>
+          <p:nvPr/>
+        </p:nvPicPr>
+        <p:blipFill>
+          <a:blip r:embed="rId5">
+            <a:alphaModFix amt="25000"/>
+          </a:blip>
+          <a:srcRect l="0" t="0" r="0" b="0"/>
+          <a:stretch>
+            <a:fillRect/>
+          </a:stretch>
+        </p:blipFill>
+        <p:spPr>
+          <a:xfrm flipH="false" flipV="false" rot="-3435299">
+            <a:off x="-3167656" y="638455"/>
+            <a:ext cx="6335313" cy="7076795"/>
+          </a:xfrm>
+          <a:prstGeom prst="rect">
+            <a:avLst/>
+          </a:prstGeom>
+        </p:spPr>
+      </p:pic>
+    </p:spTree>
+  </p:cSld>
+  <p:clrMapOvr>
+    <a:masterClrMapping/>
+  </p:clrMapOvr>
+  <p:transition spd="slow">
+    <p:push dir="l"/>
+  </p:transition>
+</p:sld>
+</file>
+
 <file path=ppt/slides/slide2.xml><?xml version="1.0" encoding="utf-8"?>
 <p:sld xmlns:p="http://schemas.openxmlformats.org/presentationml/2006/main" xmlns:a="http://schemas.openxmlformats.org/drawingml/2006/main" xmlns:r="http://schemas.openxmlformats.org/officeDocument/2006/relationships">
   <p:cSld>
@@ -7159,7 +7645,7 @@
     <p:bg>
       <p:bgPr>
         <a:solidFill>
-          <a:srgbClr val="FFFCF7"/>
+          <a:srgbClr val="F6E4E3"/>
         </a:solidFill>
       </p:bgPr>
     </p:bg>
@@ -7177,43 +7663,108 @@
           <a:chExt cx="0" cy="0"/>
         </a:xfrm>
       </p:grpSpPr>
-      <p:pic>
-        <p:nvPicPr>
-          <p:cNvPr name="Picture 2" id="2"/>
-          <p:cNvPicPr>
-            <a:picLocks noChangeAspect="true"/>
-          </p:cNvPicPr>
-          <p:nvPr/>
-        </p:nvPicPr>
-        <p:blipFill>
-          <a:blip r:embed="rId2">
-            <a:alphaModFix amt="25000"/>
-          </a:blip>
-          <a:srcRect l="0" t="0" r="0" b="0"/>
-          <a:stretch>
-            <a:fillRect/>
-          </a:stretch>
-        </p:blipFill>
+      <p:sp>
+        <p:nvSpPr>
+          <p:cNvPr name="Freeform 2" id="2"/>
+          <p:cNvSpPr/>
+          <p:nvPr/>
+        </p:nvSpPr>
         <p:spPr>
           <a:xfrm flipH="false" flipV="false" rot="0">
-            <a:off x="-1662681" y="-6438340"/>
-            <a:ext cx="13761077" cy="14153590"/>
-          </a:xfrm>
-          <a:prstGeom prst="rect">
-            <a:avLst/>
-          </a:prstGeom>
-        </p:spPr>
-      </p:pic>
-      <p:sp>
-        <p:nvSpPr>
-          <p:cNvPr name="TextBox 3" id="3"/>
+            <a:off x="631907" y="3054207"/>
+            <a:ext cx="8172962" cy="5869673"/>
+          </a:xfrm>
+          <a:custGeom>
+            <a:avLst/>
+            <a:gdLst/>
+            <a:ahLst/>
+            <a:cxnLst/>
+            <a:rect r="r" b="b" t="t" l="l"/>
+            <a:pathLst>
+              <a:path h="5869673" w="8172962">
+                <a:moveTo>
+                  <a:pt x="0" y="0"/>
+                </a:moveTo>
+                <a:lnTo>
+                  <a:pt x="8172962" y="0"/>
+                </a:lnTo>
+                <a:lnTo>
+                  <a:pt x="8172962" y="5869673"/>
+                </a:lnTo>
+                <a:lnTo>
+                  <a:pt x="0" y="5869673"/>
+                </a:lnTo>
+                <a:lnTo>
+                  <a:pt x="0" y="0"/>
+                </a:lnTo>
+                <a:close/>
+              </a:path>
+            </a:pathLst>
+          </a:custGeom>
+          <a:blipFill>
+            <a:blip r:embed="rId2"/>
+            <a:stretch>
+              <a:fillRect l="0" t="0" r="0" b="0"/>
+            </a:stretch>
+          </a:blipFill>
+        </p:spPr>
+      </p:sp>
+      <p:sp>
+        <p:nvSpPr>
+          <p:cNvPr name="Freeform 3" id="3"/>
+          <p:cNvSpPr/>
+          <p:nvPr/>
+        </p:nvSpPr>
+        <p:spPr>
+          <a:xfrm flipH="false" flipV="false" rot="0">
+            <a:off x="9454184" y="2824729"/>
+            <a:ext cx="8230856" cy="5860882"/>
+          </a:xfrm>
+          <a:custGeom>
+            <a:avLst/>
+            <a:gdLst/>
+            <a:ahLst/>
+            <a:cxnLst/>
+            <a:rect r="r" b="b" t="t" l="l"/>
+            <a:pathLst>
+              <a:path h="5860882" w="8230856">
+                <a:moveTo>
+                  <a:pt x="0" y="0"/>
+                </a:moveTo>
+                <a:lnTo>
+                  <a:pt x="8230856" y="0"/>
+                </a:lnTo>
+                <a:lnTo>
+                  <a:pt x="8230856" y="5860882"/>
+                </a:lnTo>
+                <a:lnTo>
+                  <a:pt x="0" y="5860882"/>
+                </a:lnTo>
+                <a:lnTo>
+                  <a:pt x="0" y="0"/>
+                </a:lnTo>
+                <a:close/>
+              </a:path>
+            </a:pathLst>
+          </a:custGeom>
+          <a:blipFill>
+            <a:blip r:embed="rId3"/>
+            <a:stretch>
+              <a:fillRect l="0" t="0" r="0" b="0"/>
+            </a:stretch>
+          </a:blipFill>
+        </p:spPr>
+      </p:sp>
+      <p:sp>
+        <p:nvSpPr>
+          <p:cNvPr name="TextBox 4" id="4"/>
           <p:cNvSpPr txBox="true"/>
           <p:nvPr/>
         </p:nvSpPr>
         <p:spPr>
           <a:xfrm rot="0">
-            <a:off x="2867561" y="2684205"/>
-            <a:ext cx="12516264" cy="3431177"/>
+            <a:off x="1604389" y="309590"/>
+            <a:ext cx="15433791" cy="1247721"/>
           </a:xfrm>
           <a:prstGeom prst="rect">
             <a:avLst/>
@@ -7225,16 +7776,16 @@
           </a:bodyPr>
           <a:lstStyle/>
           <a:p>
-            <a:pPr algn="ctr" marL="0" indent="0" lvl="0">
+            <a:pPr algn="l" marL="0" indent="0" lvl="0">
               <a:lnSpc>
-                <a:spcPts val="12419"/>
+                <a:spcPts val="8399"/>
               </a:lnSpc>
               <a:spcBef>
                 <a:spcPct val="0"/>
               </a:spcBef>
             </a:pPr>
             <a:r>
-              <a:rPr lang="en-US" sz="10349">
+              <a:rPr lang="en-US" sz="6999">
                 <a:solidFill>
                   <a:srgbClr val="2B2B2B"/>
                 </a:solidFill>
@@ -7243,92 +7794,11 @@
                 <a:cs typeface="Agrandir"/>
                 <a:sym typeface="Agrandir"/>
               </a:rPr>
-              <a:t>Let’s get to the web app!</a:t>
-            </a:r>
-          </a:p>
-        </p:txBody>
-      </p:sp>
-      <p:pic>
-        <p:nvPicPr>
-          <p:cNvPr name="Picture 4" id="4"/>
-          <p:cNvPicPr>
-            <a:picLocks noChangeAspect="true"/>
-          </p:cNvPicPr>
-          <p:nvPr/>
-        </p:nvPicPr>
-        <p:blipFill>
-          <a:blip r:embed="rId3">
-            <a:alphaModFix amt="25000"/>
-          </a:blip>
-          <a:srcRect l="0" t="0" r="0" b="0"/>
-          <a:stretch>
-            <a:fillRect/>
-          </a:stretch>
-        </p:blipFill>
-        <p:spPr>
-          <a:xfrm flipH="false" flipV="false" rot="0">
-            <a:off x="11511932" y="6947324"/>
-            <a:ext cx="8674222" cy="7652259"/>
-          </a:xfrm>
-          <a:prstGeom prst="rect">
-            <a:avLst/>
-          </a:prstGeom>
-        </p:spPr>
-      </p:pic>
-      <p:pic>
-        <p:nvPicPr>
-          <p:cNvPr name="Picture 5" id="5"/>
-          <p:cNvPicPr>
-            <a:picLocks noChangeAspect="true"/>
-          </p:cNvPicPr>
-          <p:nvPr/>
-        </p:nvPicPr>
-        <p:blipFill>
-          <a:blip r:embed="rId4">
-            <a:alphaModFix amt="25000"/>
-          </a:blip>
-          <a:srcRect l="0" t="0" r="0" b="0"/>
-          <a:stretch>
-            <a:fillRect/>
-          </a:stretch>
-        </p:blipFill>
-        <p:spPr>
-          <a:xfrm flipH="false" flipV="false" rot="0">
-            <a:off x="15141061" y="2810706"/>
-            <a:ext cx="6293877" cy="5612932"/>
-          </a:xfrm>
-          <a:prstGeom prst="rect">
-            <a:avLst/>
-          </a:prstGeom>
-        </p:spPr>
-      </p:pic>
-      <p:pic>
-        <p:nvPicPr>
-          <p:cNvPr name="Picture 6" id="6"/>
-          <p:cNvPicPr>
-            <a:picLocks noChangeAspect="true"/>
-          </p:cNvPicPr>
-          <p:nvPr/>
-        </p:nvPicPr>
-        <p:blipFill>
-          <a:blip r:embed="rId5">
-            <a:alphaModFix amt="25000"/>
-          </a:blip>
-          <a:srcRect l="0" t="0" r="0" b="0"/>
-          <a:stretch>
-            <a:fillRect/>
-          </a:stretch>
-        </p:blipFill>
-        <p:spPr>
-          <a:xfrm flipH="false" flipV="false" rot="-3435299">
-            <a:off x="-3167656" y="638455"/>
-            <a:ext cx="6335313" cy="7076795"/>
-          </a:xfrm>
-          <a:prstGeom prst="rect">
-            <a:avLst/>
-          </a:prstGeom>
-        </p:spPr>
-      </p:pic>
+              <a:t>Further development / ongoing ideas </a:t>
+            </a:r>
+          </a:p>
+        </p:txBody>
+      </p:sp>
     </p:spTree>
   </p:cSld>
   <p:clrMapOvr>

</xml_diff>